<commit_message>
Upload on Dec 04
</commit_message>
<xml_diff>
--- a/report/SM DIAGRAM re.pptx
+++ b/report/SM DIAGRAM re.pptx
@@ -5058,7 +5058,7 @@
     <mc:Choice Requires="p14">
       <p:transition/>
     </mc:Choice>
-    <mc:Fallback xmlns:dsp="http://schemas.microsoft.com/office/drawing/2008/diagram" xmlns:dgm="http://schemas.openxmlformats.org/drawingml/2006/diagram" xmlns:c="http://schemas.openxmlformats.org/drawingml/2006/chart" xmlns="">
+    <mc:Fallback xmlns="" xmlns:c="http://schemas.openxmlformats.org/drawingml/2006/chart" xmlns:dgm="http://schemas.openxmlformats.org/drawingml/2006/diagram" xmlns:dsp="http://schemas.microsoft.com/office/drawing/2008/diagram">
       <p:transition/>
     </mc:Fallback>
   </mc:AlternateContent>
@@ -6978,7 +6978,7 @@
     <mc:Choice Requires="p14">
       <p:transition/>
     </mc:Choice>
-    <mc:Fallback xmlns:dsp="http://schemas.microsoft.com/office/drawing/2008/diagram" xmlns:dgm="http://schemas.openxmlformats.org/drawingml/2006/diagram" xmlns:c="http://schemas.openxmlformats.org/drawingml/2006/chart" xmlns="">
+    <mc:Fallback xmlns="" xmlns:c="http://schemas.openxmlformats.org/drawingml/2006/chart" xmlns:dgm="http://schemas.openxmlformats.org/drawingml/2006/diagram" xmlns:dsp="http://schemas.microsoft.com/office/drawing/2008/diagram">
       <p:transition/>
     </mc:Fallback>
   </mc:AlternateContent>
@@ -7066,7 +7066,7 @@
         </p:blipFill>
         <p:spPr>
           <a:xfrm>
-            <a:off x="4381500" y="1504950"/>
+            <a:off x="3409950" y="652145"/>
             <a:ext cx="3429000" cy="3848100"/>
           </a:xfrm>
           <a:prstGeom prst="rect">
@@ -7182,6 +7182,387 @@
           </a:p>
         </p:txBody>
       </p:sp>
+      <p:pic>
+        <p:nvPicPr>
+          <p:cNvPr id="5" name="shape1039">
+            <a:extLst>
+              <a:ext uri="{FF2B5EF4-FFF2-40B4-BE49-F238E27FC236}">
+                <a16:creationId xmlns:a16="http://schemas.microsoft.com/office/drawing/2014/main" id="{40CB33B2-B9B2-4CD8-8E42-44FA3ACF917A}"/>
+              </a:ext>
+            </a:extLst>
+          </p:cNvPr>
+          <p:cNvPicPr/>
+          <p:nvPr/>
+        </p:nvPicPr>
+        <p:blipFill>
+          <a:blip r:embed="rId3">
+            <a:extLst>
+              <a:ext uri="{28A0092B-C50C-407E-A947-70E740481C1C}">
+                <a14:useLocalDpi xmlns:a14="http://schemas.microsoft.com/office/drawing/2010/main" val="0"/>
+              </a:ext>
+            </a:extLst>
+          </a:blip>
+          <a:srcRect/>
+          <a:stretch>
+            <a:fillRect/>
+          </a:stretch>
+        </p:blipFill>
+        <p:spPr>
+          <a:xfrm>
+            <a:off x="7480300" y="1305242"/>
+            <a:ext cx="3429000" cy="1430020"/>
+          </a:xfrm>
+          <a:prstGeom prst="rect">
+            <a:avLst/>
+          </a:prstGeom>
+        </p:spPr>
+      </p:pic>
+      <p:sp>
+        <p:nvSpPr>
+          <p:cNvPr id="6" name="shape1028">
+            <a:extLst>
+              <a:ext uri="{FF2B5EF4-FFF2-40B4-BE49-F238E27FC236}">
+                <a16:creationId xmlns:a16="http://schemas.microsoft.com/office/drawing/2014/main" id="{302A2B80-A622-4E2B-9646-7D9CB7249C78}"/>
+              </a:ext>
+            </a:extLst>
+          </p:cNvPr>
+          <p:cNvSpPr>
+            <a:spLocks/>
+          </p:cNvSpPr>
+          <p:nvPr/>
+        </p:nvSpPr>
+        <p:spPr>
+          <a:xfrm>
+            <a:off x="10279380" y="2437765"/>
+            <a:ext cx="186690" cy="138430"/>
+          </a:xfrm>
+          <a:prstGeom prst="rightArrow">
+            <a:avLst>
+              <a:gd name="adj1" fmla="val 50000"/>
+              <a:gd name="adj2" fmla="val 50000"/>
+            </a:avLst>
+          </a:prstGeom>
+          <a:solidFill>
+            <a:schemeClr val="accent1">
+              <a:lumMod val="60000"/>
+              <a:lumOff val="40000"/>
+            </a:schemeClr>
+          </a:solidFill>
+          <a:ln>
+            <a:noFill/>
+          </a:ln>
+        </p:spPr>
+        <p:style>
+          <a:lnRef idx="2">
+            <a:schemeClr val="accent1">
+              <a:shade val="50000"/>
+            </a:schemeClr>
+          </a:lnRef>
+          <a:fillRef idx="1">
+            <a:schemeClr val="accent1"/>
+          </a:fillRef>
+          <a:effectRef idx="0">
+            <a:schemeClr val="accent1"/>
+          </a:effectRef>
+          <a:fontRef idx="minor">
+            <a:schemeClr val="lt1"/>
+          </a:fontRef>
+        </p:style>
+        <p:txBody>
+          <a:bodyPr rot="0" vert="horz" wrap="square" lIns="91440" tIns="45720" rIns="91440" bIns="45720" anchor="ctr">
+            <a:noAutofit/>
+          </a:bodyPr>
+          <a:lstStyle/>
+          <a:p>
+            <a:endParaRPr lang="ko-KR" altLang="en-US">
+              <a:latin typeface="KoPubWorld돋움체 Light" panose="00000300000000000000" pitchFamily="2" charset="-127"/>
+              <a:ea typeface="KoPubWorld돋움체 Light" panose="00000300000000000000" pitchFamily="2" charset="-127"/>
+              <a:cs typeface="KoPubWorld돋움체 Light" panose="00000300000000000000" pitchFamily="2" charset="-127"/>
+            </a:endParaRPr>
+          </a:p>
+        </p:txBody>
+      </p:sp>
+      <p:sp>
+        <p:nvSpPr>
+          <p:cNvPr id="8" name="shape1029">
+            <a:extLst>
+              <a:ext uri="{FF2B5EF4-FFF2-40B4-BE49-F238E27FC236}">
+                <a16:creationId xmlns:a16="http://schemas.microsoft.com/office/drawing/2014/main" id="{4705F9BD-6804-4BF0-BE9C-D8E654F1E7DB}"/>
+              </a:ext>
+            </a:extLst>
+          </p:cNvPr>
+          <p:cNvSpPr>
+            <a:spLocks/>
+          </p:cNvSpPr>
+          <p:nvPr/>
+        </p:nvSpPr>
+        <p:spPr>
+          <a:xfrm>
+            <a:off x="9942830" y="2382520"/>
+            <a:ext cx="325120" cy="276860"/>
+          </a:xfrm>
+          <a:prstGeom prst="rect">
+            <a:avLst/>
+          </a:prstGeom>
+          <a:solidFill>
+            <a:schemeClr val="accent1">
+              <a:lumMod val="60000"/>
+              <a:lumOff val="40000"/>
+            </a:schemeClr>
+          </a:solidFill>
+          <a:ln>
+            <a:noFill/>
+          </a:ln>
+        </p:spPr>
+        <p:style>
+          <a:lnRef idx="2">
+            <a:schemeClr val="accent1">
+              <a:shade val="50000"/>
+            </a:schemeClr>
+          </a:lnRef>
+          <a:fillRef idx="1">
+            <a:schemeClr val="accent1"/>
+          </a:fillRef>
+          <a:effectRef idx="0">
+            <a:schemeClr val="accent1"/>
+          </a:effectRef>
+          <a:fontRef idx="minor">
+            <a:schemeClr val="lt1"/>
+          </a:fontRef>
+        </p:style>
+        <p:txBody>
+          <a:bodyPr rot="0" vert="horz" wrap="square" lIns="91440" tIns="45720" rIns="91440" bIns="45720" anchor="ctr">
+            <a:noAutofit/>
+          </a:bodyPr>
+          <a:lstStyle/>
+          <a:p>
+            <a:pPr algn="ctr" latinLnBrk="1">
+              <a:lnSpc>
+                <a:spcPct val="107000"/>
+              </a:lnSpc>
+              <a:spcAft>
+                <a:spcPts val="800"/>
+              </a:spcAft>
+            </a:pPr>
+            <a:r>
+              <a:rPr lang="en-US" sz="1000" kern="100">
+                <a:effectLst/>
+                <a:latin typeface="KoPubWorld돋움체 Light" panose="00000300000000000000" pitchFamily="2" charset="-127"/>
+                <a:ea typeface="KoPubWorld돋움체 Light" panose="00000300000000000000" pitchFamily="2" charset="-127"/>
+                <a:cs typeface="KoPubWorld돋움체 Light" panose="00000300000000000000" pitchFamily="2" charset="-127"/>
+              </a:rPr>
+              <a:t>s1</a:t>
+            </a:r>
+            <a:endParaRPr lang="ko-KR" sz="1000" kern="100">
+              <a:effectLst/>
+              <a:latin typeface="KoPubWorld돋움체 Light" panose="00000300000000000000" pitchFamily="2" charset="-127"/>
+              <a:ea typeface="KoPubWorld돋움체 Light" panose="00000300000000000000" pitchFamily="2" charset="-127"/>
+              <a:cs typeface="KoPubWorld돋움체 Light" panose="00000300000000000000" pitchFamily="2" charset="-127"/>
+            </a:endParaRPr>
+          </a:p>
+        </p:txBody>
+      </p:sp>
+      <p:sp>
+        <p:nvSpPr>
+          <p:cNvPr id="11" name="shape1042">
+            <a:extLst>
+              <a:ext uri="{FF2B5EF4-FFF2-40B4-BE49-F238E27FC236}">
+                <a16:creationId xmlns:a16="http://schemas.microsoft.com/office/drawing/2014/main" id="{FF98B641-FD4F-49AE-9029-2581EE32E5DA}"/>
+              </a:ext>
+            </a:extLst>
+          </p:cNvPr>
+          <p:cNvSpPr>
+            <a:spLocks/>
+          </p:cNvSpPr>
+          <p:nvPr/>
+        </p:nvSpPr>
+        <p:spPr>
+          <a:xfrm>
+            <a:off x="7740650" y="5051425"/>
+            <a:ext cx="262890" cy="255905"/>
+          </a:xfrm>
+          <a:prstGeom prst="rect">
+            <a:avLst/>
+          </a:prstGeom>
+          <a:ln>
+            <a:noFill/>
+          </a:ln>
+        </p:spPr>
+        <p:style>
+          <a:lnRef idx="2">
+            <a:schemeClr val="accent1">
+              <a:shade val="50000"/>
+            </a:schemeClr>
+          </a:lnRef>
+          <a:fillRef idx="1">
+            <a:schemeClr val="accent1"/>
+          </a:fillRef>
+          <a:effectRef idx="0">
+            <a:schemeClr val="accent1"/>
+          </a:effectRef>
+          <a:fontRef idx="minor">
+            <a:schemeClr val="lt1"/>
+          </a:fontRef>
+        </p:style>
+        <p:txBody>
+          <a:bodyPr rot="0" vert="horz" wrap="square" lIns="91440" tIns="45720" rIns="91440" bIns="45720" anchor="ctr">
+            <a:noAutofit/>
+          </a:bodyPr>
+          <a:lstStyle/>
+          <a:p>
+            <a:pPr algn="ctr" latinLnBrk="1">
+              <a:lnSpc>
+                <a:spcPct val="107000"/>
+              </a:lnSpc>
+              <a:spcAft>
+                <a:spcPts val="800"/>
+              </a:spcAft>
+            </a:pPr>
+            <a:r>
+              <a:rPr lang="en-US" sz="800" kern="100" dirty="0">
+                <a:effectLst/>
+                <a:latin typeface="KoPubWorld돋움체 Light" panose="00000300000000000000" pitchFamily="2" charset="-127"/>
+                <a:ea typeface="KoPubWorld돋움체 Light" panose="00000300000000000000" pitchFamily="2" charset="-127"/>
+                <a:cs typeface="KoPubWorld돋움체 Light" panose="00000300000000000000" pitchFamily="2" charset="-127"/>
+              </a:rPr>
+              <a:t>A</a:t>
+            </a:r>
+            <a:r>
+              <a:rPr lang="en-US" sz="1000" kern="100" dirty="0">
+                <a:effectLst/>
+                <a:latin typeface="KoPubWorld돋움체 Light" panose="00000300000000000000" pitchFamily="2" charset="-127"/>
+                <a:ea typeface="KoPubWorld돋움체 Light" panose="00000300000000000000" pitchFamily="2" charset="-127"/>
+                <a:cs typeface="KoPubWorld돋움체 Light" panose="00000300000000000000" pitchFamily="2" charset="-127"/>
+              </a:rPr>
+              <a:t> </a:t>
+            </a:r>
+            <a:endParaRPr lang="ko-KR" sz="1000" kern="100" dirty="0">
+              <a:effectLst/>
+              <a:latin typeface="KoPubWorld돋움체 Light" panose="00000300000000000000" pitchFamily="2" charset="-127"/>
+              <a:ea typeface="KoPubWorld돋움체 Light" panose="00000300000000000000" pitchFamily="2" charset="-127"/>
+              <a:cs typeface="KoPubWorld돋움체 Light" panose="00000300000000000000" pitchFamily="2" charset="-127"/>
+            </a:endParaRPr>
+          </a:p>
+        </p:txBody>
+      </p:sp>
+      <p:sp>
+        <p:nvSpPr>
+          <p:cNvPr id="12" name="shape1045">
+            <a:extLst>
+              <a:ext uri="{FF2B5EF4-FFF2-40B4-BE49-F238E27FC236}">
+                <a16:creationId xmlns:a16="http://schemas.microsoft.com/office/drawing/2014/main" id="{88DC58E1-63F5-41AA-8324-EA456CF0FAD8}"/>
+              </a:ext>
+            </a:extLst>
+          </p:cNvPr>
+          <p:cNvSpPr>
+            <a:spLocks/>
+          </p:cNvSpPr>
+          <p:nvPr/>
+        </p:nvSpPr>
+        <p:spPr>
+          <a:xfrm>
+            <a:off x="7740650" y="5424805"/>
+            <a:ext cx="262890" cy="255905"/>
+          </a:xfrm>
+          <a:prstGeom prst="rect">
+            <a:avLst/>
+          </a:prstGeom>
+          <a:ln>
+            <a:noFill/>
+          </a:ln>
+        </p:spPr>
+        <p:style>
+          <a:lnRef idx="2">
+            <a:schemeClr val="accent1">
+              <a:shade val="50000"/>
+            </a:schemeClr>
+          </a:lnRef>
+          <a:fillRef idx="1">
+            <a:schemeClr val="accent1"/>
+          </a:fillRef>
+          <a:effectRef idx="0">
+            <a:schemeClr val="accent1"/>
+          </a:effectRef>
+          <a:fontRef idx="minor">
+            <a:schemeClr val="lt1"/>
+          </a:fontRef>
+        </p:style>
+        <p:txBody>
+          <a:bodyPr rot="0" vert="horz" wrap="square" lIns="91440" tIns="45720" rIns="91440" bIns="45720" anchor="ctr">
+            <a:noAutofit/>
+          </a:bodyPr>
+          <a:lstStyle/>
+          <a:p>
+            <a:pPr algn="ctr" latinLnBrk="1">
+              <a:lnSpc>
+                <a:spcPct val="107000"/>
+              </a:lnSpc>
+              <a:spcAft>
+                <a:spcPts val="800"/>
+              </a:spcAft>
+            </a:pPr>
+            <a:r>
+              <a:rPr lang="en-US" sz="800" kern="100">
+                <a:effectLst/>
+                <a:latin typeface="KoPubWorld돋움체 Light" panose="00000300000000000000" pitchFamily="2" charset="-127"/>
+                <a:ea typeface="KoPubWorld돋움체 Light" panose="00000300000000000000" pitchFamily="2" charset="-127"/>
+                <a:cs typeface="KoPubWorld돋움체 Light" panose="00000300000000000000" pitchFamily="2" charset="-127"/>
+              </a:rPr>
+              <a:t>B</a:t>
+            </a:r>
+            <a:r>
+              <a:rPr lang="en-US" sz="1000" kern="100">
+                <a:effectLst/>
+                <a:latin typeface="KoPubWorld돋움체 Light" panose="00000300000000000000" pitchFamily="2" charset="-127"/>
+                <a:ea typeface="KoPubWorld돋움체 Light" panose="00000300000000000000" pitchFamily="2" charset="-127"/>
+                <a:cs typeface="KoPubWorld돋움체 Light" panose="00000300000000000000" pitchFamily="2" charset="-127"/>
+              </a:rPr>
+              <a:t> </a:t>
+            </a:r>
+            <a:endParaRPr lang="ko-KR" sz="1000" kern="100">
+              <a:effectLst/>
+              <a:latin typeface="KoPubWorld돋움체 Light" panose="00000300000000000000" pitchFamily="2" charset="-127"/>
+              <a:ea typeface="KoPubWorld돋움체 Light" panose="00000300000000000000" pitchFamily="2" charset="-127"/>
+              <a:cs typeface="KoPubWorld돋움체 Light" panose="00000300000000000000" pitchFamily="2" charset="-127"/>
+            </a:endParaRPr>
+          </a:p>
+        </p:txBody>
+      </p:sp>
+      <p:pic>
+        <p:nvPicPr>
+          <p:cNvPr id="13" name="shape1041">
+            <a:extLst>
+              <a:ext uri="{FF2B5EF4-FFF2-40B4-BE49-F238E27FC236}">
+                <a16:creationId xmlns:a16="http://schemas.microsoft.com/office/drawing/2014/main" id="{11569CCE-C7A4-4103-A97A-0F46F497EA4B}"/>
+              </a:ext>
+            </a:extLst>
+          </p:cNvPr>
+          <p:cNvPicPr/>
+          <p:nvPr/>
+        </p:nvPicPr>
+        <p:blipFill>
+          <a:blip r:embed="rId4">
+            <a:extLst>
+              <a:ext uri="{28A0092B-C50C-407E-A947-70E740481C1C}">
+                <a14:useLocalDpi xmlns:a14="http://schemas.microsoft.com/office/drawing/2010/main" val="0"/>
+              </a:ext>
+            </a:extLst>
+          </a:blip>
+          <a:srcRect l="2590" r="4383" b="15017"/>
+          <a:stretch>
+            <a:fillRect/>
+          </a:stretch>
+        </p:blipFill>
+        <p:spPr>
+          <a:xfrm>
+            <a:off x="8107362" y="4773930"/>
+            <a:ext cx="3234055" cy="1724660"/>
+          </a:xfrm>
+          <a:prstGeom prst="rect">
+            <a:avLst/>
+          </a:prstGeom>
+        </p:spPr>
+      </p:pic>
     </p:spTree>
   </p:cSld>
   <p:clrMapOvr>
@@ -7191,7 +7572,7 @@
     <mc:Choice Requires="p14">
       <p:transition/>
     </mc:Choice>
-    <mc:Fallback xmlns:dsp="http://schemas.microsoft.com/office/drawing/2008/diagram" xmlns:dgm="http://schemas.openxmlformats.org/drawingml/2006/diagram" xmlns:c="http://schemas.openxmlformats.org/drawingml/2006/chart" xmlns="">
+    <mc:Fallback xmlns="" xmlns:c="http://schemas.openxmlformats.org/drawingml/2006/chart" xmlns:dgm="http://schemas.openxmlformats.org/drawingml/2006/diagram" xmlns:dsp="http://schemas.microsoft.com/office/drawing/2008/diagram">
       <p:transition/>
     </mc:Fallback>
   </mc:AlternateContent>

</xml_diff>